<commit_message>
Moving presentation from PPTX to HTML
</commit_message>
<xml_diff>
--- a/CssDemo.pptx
+++ b/CssDemo.pptx
@@ -22,6 +22,10 @@
     <p:sldId id="270" r:id="rId16"/>
     <p:sldId id="271" r:id="rId17"/>
     <p:sldId id="272" r:id="rId18"/>
+    <p:sldId id="273" r:id="rId19"/>
+    <p:sldId id="274" r:id="rId20"/>
+    <p:sldId id="275" r:id="rId21"/>
+    <p:sldId id="276" r:id="rId22"/>
   </p:sldIdLst>
   <p:sldSz cx="12192000" cy="6858000"/>
   <p:notesSz cx="6858000" cy="9144000"/>
@@ -4242,6 +4246,252 @@
 </p:sld>
 </file>
 
+<file path=ppt/slides/slide18.xml><?xml version="1.0" encoding="utf-8"?>
+<p:sld xmlns:a="http://schemas.openxmlformats.org/drawingml/2006/main" xmlns:r="http://schemas.openxmlformats.org/officeDocument/2006/relationships" xmlns:p="http://schemas.openxmlformats.org/presentationml/2006/main">
+  <p:cSld>
+    <p:spTree>
+      <p:nvGrpSpPr>
+        <p:cNvPr id="1" name=""/>
+        <p:cNvGrpSpPr/>
+        <p:nvPr/>
+      </p:nvGrpSpPr>
+      <p:grpSpPr>
+        <a:xfrm>
+          <a:off x="0" y="0"/>
+          <a:ext cx="0" cy="0"/>
+          <a:chOff x="0" y="0"/>
+          <a:chExt cx="0" cy="0"/>
+        </a:xfrm>
+      </p:grpSpPr>
+      <p:sp>
+        <p:nvSpPr>
+          <p:cNvPr id="3" name="Subtitle 2"/>
+          <p:cNvSpPr>
+            <a:spLocks noGrp="1"/>
+          </p:cNvSpPr>
+          <p:nvPr>
+            <p:ph type="subTitle" idx="1"/>
+          </p:nvPr>
+        </p:nvSpPr>
+        <p:spPr>
+          <a:xfrm>
+            <a:off x="280657" y="353085"/>
+            <a:ext cx="11416420" cy="6219731"/>
+          </a:xfrm>
+        </p:spPr>
+        <p:txBody>
+          <a:bodyPr/>
+          <a:lstStyle/>
+          <a:p>
+            <a:pPr algn="l"/>
+            <a:r>
+              <a:rPr lang="en-US" dirty="0" smtClean="0"/>
+              <a:t>Problem 8: </a:t>
+            </a:r>
+          </a:p>
+          <a:p>
+            <a:pPr algn="l"/>
+            <a:endParaRPr lang="en-US" dirty="0"/>
+          </a:p>
+          <a:p>
+            <a:pPr marL="342900" indent="-342900" algn="l">
+              <a:buFont typeface="Arial" panose="020B0604020202020204" pitchFamily="34" charset="0"/>
+              <a:buChar char="•"/>
+            </a:pPr>
+            <a:r>
+              <a:rPr lang="en-US" dirty="0" smtClean="0"/>
+              <a:t>We need to stick an element with unknown size next to dynamic element</a:t>
+            </a:r>
+          </a:p>
+          <a:p>
+            <a:pPr marL="342900" indent="-342900" algn="l">
+              <a:buFont typeface="Arial" panose="020B0604020202020204" pitchFamily="34" charset="0"/>
+              <a:buChar char="•"/>
+            </a:pPr>
+            <a:r>
+              <a:rPr lang="en-US" dirty="0" smtClean="0"/>
+              <a:t>Easy</a:t>
+            </a:r>
+          </a:p>
+          <a:p>
+            <a:pPr marL="342900" indent="-342900" algn="l">
+              <a:buFont typeface="Arial" panose="020B0604020202020204" pitchFamily="34" charset="0"/>
+              <a:buChar char="•"/>
+            </a:pPr>
+            <a:r>
+              <a:rPr lang="en-US" dirty="0" smtClean="0"/>
+              <a:t>Until we need to do it on the left side</a:t>
+            </a:r>
+          </a:p>
+          <a:p>
+            <a:pPr marL="342900" indent="-342900" algn="l">
+              <a:buFont typeface="Arial" panose="020B0604020202020204" pitchFamily="34" charset="0"/>
+              <a:buChar char="•"/>
+            </a:pPr>
+            <a:r>
+              <a:rPr lang="en-US" dirty="0" smtClean="0"/>
+              <a:t>This 100% is not the 100% you’re looking for</a:t>
+            </a:r>
+            <a:endParaRPr lang="en-AU" dirty="0" smtClean="0"/>
+          </a:p>
+          <a:p>
+            <a:pPr marL="342900" indent="-342900" algn="l">
+              <a:buFont typeface="Arial" panose="020B0604020202020204" pitchFamily="34" charset="0"/>
+              <a:buChar char="•"/>
+            </a:pPr>
+            <a:endParaRPr lang="en-US" dirty="0" smtClean="0"/>
+          </a:p>
+          <a:p>
+            <a:pPr marL="342900" indent="-342900" algn="l">
+              <a:buFont typeface="Arial" panose="020B0604020202020204" pitchFamily="34" charset="0"/>
+              <a:buChar char="•"/>
+            </a:pPr>
+            <a:endParaRPr lang="en-AU" dirty="0" smtClean="0"/>
+          </a:p>
+          <a:p>
+            <a:pPr marL="342900" indent="-342900" algn="l">
+              <a:buFont typeface="Arial" panose="020B0604020202020204" pitchFamily="34" charset="0"/>
+              <a:buChar char="•"/>
+            </a:pPr>
+            <a:endParaRPr lang="en-US" dirty="0" smtClean="0"/>
+          </a:p>
+          <a:p>
+            <a:pPr marL="342900" indent="-342900" algn="l">
+              <a:buFont typeface="Arial" panose="020B0604020202020204" pitchFamily="34" charset="0"/>
+              <a:buChar char="•"/>
+            </a:pPr>
+            <a:endParaRPr lang="en-US" dirty="0" smtClean="0"/>
+          </a:p>
+        </p:txBody>
+      </p:sp>
+    </p:spTree>
+    <p:extLst>
+      <p:ext uri="{BB962C8B-B14F-4D97-AF65-F5344CB8AC3E}">
+        <p14:creationId xmlns:p14="http://schemas.microsoft.com/office/powerpoint/2010/main" val="1716311435"/>
+      </p:ext>
+    </p:extLst>
+  </p:cSld>
+  <p:clrMapOvr>
+    <a:masterClrMapping/>
+  </p:clrMapOvr>
+  <p:timing>
+    <p:tnLst>
+      <p:par>
+        <p:cTn id="1" dur="indefinite" restart="never" nodeType="tmRoot"/>
+      </p:par>
+    </p:tnLst>
+  </p:timing>
+</p:sld>
+</file>
+
+<file path=ppt/slides/slide19.xml><?xml version="1.0" encoding="utf-8"?>
+<p:sld xmlns:a="http://schemas.openxmlformats.org/drawingml/2006/main" xmlns:r="http://schemas.openxmlformats.org/officeDocument/2006/relationships" xmlns:p="http://schemas.openxmlformats.org/presentationml/2006/main">
+  <p:cSld>
+    <p:spTree>
+      <p:nvGrpSpPr>
+        <p:cNvPr id="1" name=""/>
+        <p:cNvGrpSpPr/>
+        <p:nvPr/>
+      </p:nvGrpSpPr>
+      <p:grpSpPr>
+        <a:xfrm>
+          <a:off x="0" y="0"/>
+          <a:ext cx="0" cy="0"/>
+          <a:chOff x="0" y="0"/>
+          <a:chExt cx="0" cy="0"/>
+        </a:xfrm>
+      </p:grpSpPr>
+      <p:sp>
+        <p:nvSpPr>
+          <p:cNvPr id="3" name="Subtitle 2"/>
+          <p:cNvSpPr>
+            <a:spLocks noGrp="1"/>
+          </p:cNvSpPr>
+          <p:nvPr>
+            <p:ph type="subTitle" idx="1"/>
+          </p:nvPr>
+        </p:nvSpPr>
+        <p:spPr>
+          <a:xfrm>
+            <a:off x="280657" y="353085"/>
+            <a:ext cx="11416420" cy="6219731"/>
+          </a:xfrm>
+        </p:spPr>
+        <p:txBody>
+          <a:bodyPr/>
+          <a:lstStyle/>
+          <a:p>
+            <a:pPr algn="l"/>
+            <a:r>
+              <a:rPr lang="en-US" dirty="0" smtClean="0"/>
+              <a:t>Solution 8: CSS has functions. I’m repeating myself. I know.</a:t>
+            </a:r>
+          </a:p>
+          <a:p>
+            <a:pPr algn="l"/>
+            <a:endParaRPr lang="en-US" dirty="0"/>
+          </a:p>
+          <a:p>
+            <a:pPr marL="342900" indent="-342900" algn="l">
+              <a:buFont typeface="Arial" panose="020B0604020202020204" pitchFamily="34" charset="0"/>
+              <a:buChar char="•"/>
+            </a:pPr>
+            <a:r>
+              <a:rPr lang="en-US" dirty="0" smtClean="0"/>
+              <a:t>Let’s take a look at “CSS Functions 2”</a:t>
+            </a:r>
+            <a:endParaRPr lang="en-AU" dirty="0" smtClean="0"/>
+          </a:p>
+          <a:p>
+            <a:pPr marL="342900" indent="-342900" algn="l">
+              <a:buFont typeface="Arial" panose="020B0604020202020204" pitchFamily="34" charset="0"/>
+              <a:buChar char="•"/>
+            </a:pPr>
+            <a:endParaRPr lang="en-US" dirty="0" smtClean="0"/>
+          </a:p>
+          <a:p>
+            <a:pPr marL="342900" indent="-342900" algn="l">
+              <a:buFont typeface="Arial" panose="020B0604020202020204" pitchFamily="34" charset="0"/>
+              <a:buChar char="•"/>
+            </a:pPr>
+            <a:endParaRPr lang="en-AU" dirty="0" smtClean="0"/>
+          </a:p>
+          <a:p>
+            <a:pPr marL="342900" indent="-342900" algn="l">
+              <a:buFont typeface="Arial" panose="020B0604020202020204" pitchFamily="34" charset="0"/>
+              <a:buChar char="•"/>
+            </a:pPr>
+            <a:endParaRPr lang="en-US" dirty="0" smtClean="0"/>
+          </a:p>
+          <a:p>
+            <a:pPr marL="342900" indent="-342900" algn="l">
+              <a:buFont typeface="Arial" panose="020B0604020202020204" pitchFamily="34" charset="0"/>
+              <a:buChar char="•"/>
+            </a:pPr>
+            <a:endParaRPr lang="en-US" dirty="0" smtClean="0"/>
+          </a:p>
+        </p:txBody>
+      </p:sp>
+    </p:spTree>
+    <p:extLst>
+      <p:ext uri="{BB962C8B-B14F-4D97-AF65-F5344CB8AC3E}">
+        <p14:creationId xmlns:p14="http://schemas.microsoft.com/office/powerpoint/2010/main" val="719442553"/>
+      </p:ext>
+    </p:extLst>
+  </p:cSld>
+  <p:clrMapOvr>
+    <a:masterClrMapping/>
+  </p:clrMapOvr>
+  <p:timing>
+    <p:tnLst>
+      <p:par>
+        <p:cTn id="1" dur="indefinite" restart="never" nodeType="tmRoot"/>
+      </p:par>
+    </p:tnLst>
+  </p:timing>
+</p:sld>
+</file>
+
 <file path=ppt/slides/slide2.xml><?xml version="1.0" encoding="utf-8"?>
 <p:sld xmlns:a="http://schemas.openxmlformats.org/drawingml/2006/main" xmlns:r="http://schemas.openxmlformats.org/officeDocument/2006/relationships" xmlns:p="http://schemas.openxmlformats.org/presentationml/2006/main">
   <p:cSld>
@@ -4332,6 +4582,316 @@
     <p:extLst>
       <p:ext uri="{BB962C8B-B14F-4D97-AF65-F5344CB8AC3E}">
         <p14:creationId xmlns:p14="http://schemas.microsoft.com/office/powerpoint/2010/main" val="1569927277"/>
+      </p:ext>
+    </p:extLst>
+  </p:cSld>
+  <p:clrMapOvr>
+    <a:masterClrMapping/>
+  </p:clrMapOvr>
+  <p:timing>
+    <p:tnLst>
+      <p:par>
+        <p:cTn id="1" dur="indefinite" restart="never" nodeType="tmRoot"/>
+      </p:par>
+    </p:tnLst>
+  </p:timing>
+</p:sld>
+</file>
+
+<file path=ppt/slides/slide20.xml><?xml version="1.0" encoding="utf-8"?>
+<p:sld xmlns:a="http://schemas.openxmlformats.org/drawingml/2006/main" xmlns:r="http://schemas.openxmlformats.org/officeDocument/2006/relationships" xmlns:p="http://schemas.openxmlformats.org/presentationml/2006/main">
+  <p:cSld>
+    <p:spTree>
+      <p:nvGrpSpPr>
+        <p:cNvPr id="1" name=""/>
+        <p:cNvGrpSpPr/>
+        <p:nvPr/>
+      </p:nvGrpSpPr>
+      <p:grpSpPr>
+        <a:xfrm>
+          <a:off x="0" y="0"/>
+          <a:ext cx="0" cy="0"/>
+          <a:chOff x="0" y="0"/>
+          <a:chExt cx="0" cy="0"/>
+        </a:xfrm>
+      </p:grpSpPr>
+      <p:sp>
+        <p:nvSpPr>
+          <p:cNvPr id="3" name="Subtitle 2"/>
+          <p:cNvSpPr>
+            <a:spLocks noGrp="1"/>
+          </p:cNvSpPr>
+          <p:nvPr>
+            <p:ph type="subTitle" idx="1"/>
+          </p:nvPr>
+        </p:nvSpPr>
+        <p:spPr>
+          <a:xfrm>
+            <a:off x="280657" y="353085"/>
+            <a:ext cx="11416420" cy="6219731"/>
+          </a:xfrm>
+        </p:spPr>
+        <p:txBody>
+          <a:bodyPr/>
+          <a:lstStyle/>
+          <a:p>
+            <a:pPr algn="l"/>
+            <a:r>
+              <a:rPr lang="en-US" dirty="0" smtClean="0"/>
+              <a:t>Comments</a:t>
+            </a:r>
+          </a:p>
+          <a:p>
+            <a:pPr algn="l"/>
+            <a:endParaRPr lang="en-US" dirty="0"/>
+          </a:p>
+          <a:p>
+            <a:pPr marL="342900" indent="-342900" algn="l">
+              <a:buFont typeface="Arial" panose="020B0604020202020204" pitchFamily="34" charset="0"/>
+              <a:buChar char="•"/>
+            </a:pPr>
+            <a:r>
+              <a:rPr lang="en-US" dirty="0" smtClean="0"/>
+              <a:t>Use features of LESS to make your code look much clearer</a:t>
+            </a:r>
+          </a:p>
+          <a:p>
+            <a:pPr marL="342900" indent="-342900" algn="l">
+              <a:buFont typeface="Arial" panose="020B0604020202020204" pitchFamily="34" charset="0"/>
+              <a:buChar char="•"/>
+            </a:pPr>
+            <a:r>
+              <a:rPr lang="en-US" dirty="0" smtClean="0"/>
+              <a:t>It’s not just different CSS layout</a:t>
+            </a:r>
+          </a:p>
+          <a:p>
+            <a:pPr marL="342900" indent="-342900" algn="l">
+              <a:buFont typeface="Arial" panose="020B0604020202020204" pitchFamily="34" charset="0"/>
+              <a:buChar char="•"/>
+            </a:pPr>
+            <a:r>
+              <a:rPr lang="en-US" dirty="0" smtClean="0"/>
+              <a:t>There are variables, calculated properties, </a:t>
+            </a:r>
+            <a:r>
+              <a:rPr lang="en-US" dirty="0" err="1" smtClean="0"/>
+              <a:t>mixins</a:t>
+            </a:r>
+            <a:r>
+              <a:rPr lang="en-US" dirty="0"/>
+              <a:t> </a:t>
+            </a:r>
+            <a:r>
+              <a:rPr lang="en-US" dirty="0" smtClean="0"/>
+              <a:t>and more…</a:t>
+            </a:r>
+          </a:p>
+          <a:p>
+            <a:pPr marL="342900" indent="-342900" algn="l">
+              <a:buFont typeface="Arial" panose="020B0604020202020204" pitchFamily="34" charset="0"/>
+              <a:buChar char="•"/>
+            </a:pPr>
+            <a:r>
+              <a:rPr lang="en-US" dirty="0" smtClean="0"/>
+              <a:t>Example of </a:t>
+            </a:r>
+            <a:r>
+              <a:rPr lang="en-US" dirty="0" err="1" smtClean="0"/>
+              <a:t>mixins</a:t>
+            </a:r>
+            <a:r>
+              <a:rPr lang="en-US" dirty="0" smtClean="0"/>
+              <a:t>: compare styles of negative margins 4 and 5</a:t>
+            </a:r>
+          </a:p>
+          <a:p>
+            <a:pPr marL="342900" indent="-342900" algn="l">
+              <a:buFont typeface="Arial" panose="020B0604020202020204" pitchFamily="34" charset="0"/>
+              <a:buChar char="•"/>
+            </a:pPr>
+            <a:r>
+              <a:rPr lang="en-US" dirty="0" smtClean="0"/>
+              <a:t>Example of parameters: different sizes of pretty checkboxes</a:t>
+            </a:r>
+            <a:endParaRPr lang="en-AU" dirty="0" smtClean="0"/>
+          </a:p>
+          <a:p>
+            <a:pPr marL="342900" indent="-342900" algn="l">
+              <a:buFont typeface="Arial" panose="020B0604020202020204" pitchFamily="34" charset="0"/>
+              <a:buChar char="•"/>
+            </a:pPr>
+            <a:endParaRPr lang="en-US" dirty="0" smtClean="0"/>
+          </a:p>
+          <a:p>
+            <a:pPr marL="342900" indent="-342900" algn="l">
+              <a:buFont typeface="Arial" panose="020B0604020202020204" pitchFamily="34" charset="0"/>
+              <a:buChar char="•"/>
+            </a:pPr>
+            <a:endParaRPr lang="en-AU" dirty="0" smtClean="0"/>
+          </a:p>
+          <a:p>
+            <a:pPr marL="342900" indent="-342900" algn="l">
+              <a:buFont typeface="Arial" panose="020B0604020202020204" pitchFamily="34" charset="0"/>
+              <a:buChar char="•"/>
+            </a:pPr>
+            <a:endParaRPr lang="en-US" dirty="0" smtClean="0"/>
+          </a:p>
+          <a:p>
+            <a:pPr marL="342900" indent="-342900" algn="l">
+              <a:buFont typeface="Arial" panose="020B0604020202020204" pitchFamily="34" charset="0"/>
+              <a:buChar char="•"/>
+            </a:pPr>
+            <a:endParaRPr lang="en-US" dirty="0" smtClean="0"/>
+          </a:p>
+        </p:txBody>
+      </p:sp>
+    </p:spTree>
+    <p:extLst>
+      <p:ext uri="{BB962C8B-B14F-4D97-AF65-F5344CB8AC3E}">
+        <p14:creationId xmlns:p14="http://schemas.microsoft.com/office/powerpoint/2010/main" val="1692260849"/>
+      </p:ext>
+    </p:extLst>
+  </p:cSld>
+  <p:clrMapOvr>
+    <a:masterClrMapping/>
+  </p:clrMapOvr>
+  <p:timing>
+    <p:tnLst>
+      <p:par>
+        <p:cTn id="1" dur="indefinite" restart="never" nodeType="tmRoot"/>
+      </p:par>
+    </p:tnLst>
+  </p:timing>
+</p:sld>
+</file>
+
+<file path=ppt/slides/slide21.xml><?xml version="1.0" encoding="utf-8"?>
+<p:sld xmlns:a="http://schemas.openxmlformats.org/drawingml/2006/main" xmlns:r="http://schemas.openxmlformats.org/officeDocument/2006/relationships" xmlns:p="http://schemas.openxmlformats.org/presentationml/2006/main">
+  <p:cSld>
+    <p:spTree>
+      <p:nvGrpSpPr>
+        <p:cNvPr id="1" name=""/>
+        <p:cNvGrpSpPr/>
+        <p:nvPr/>
+      </p:nvGrpSpPr>
+      <p:grpSpPr>
+        <a:xfrm>
+          <a:off x="0" y="0"/>
+          <a:ext cx="0" cy="0"/>
+          <a:chOff x="0" y="0"/>
+          <a:chExt cx="0" cy="0"/>
+        </a:xfrm>
+      </p:grpSpPr>
+      <p:sp>
+        <p:nvSpPr>
+          <p:cNvPr id="3" name="Subtitle 2"/>
+          <p:cNvSpPr>
+            <a:spLocks noGrp="1"/>
+          </p:cNvSpPr>
+          <p:nvPr>
+            <p:ph type="subTitle" idx="1"/>
+          </p:nvPr>
+        </p:nvSpPr>
+        <p:spPr>
+          <a:xfrm>
+            <a:off x="280657" y="353085"/>
+            <a:ext cx="11416420" cy="6219731"/>
+          </a:xfrm>
+        </p:spPr>
+        <p:txBody>
+          <a:bodyPr/>
+          <a:lstStyle/>
+          <a:p>
+            <a:pPr algn="l"/>
+            <a:endParaRPr lang="en-US" dirty="0"/>
+          </a:p>
+          <a:p>
+            <a:pPr algn="l"/>
+            <a:endParaRPr lang="en-US" dirty="0" smtClean="0"/>
+          </a:p>
+          <a:p>
+            <a:pPr algn="l"/>
+            <a:endParaRPr lang="en-US" dirty="0"/>
+          </a:p>
+          <a:p>
+            <a:pPr algn="l"/>
+            <a:endParaRPr lang="en-US" dirty="0" smtClean="0"/>
+          </a:p>
+          <a:p>
+            <a:pPr algn="l"/>
+            <a:r>
+              <a:rPr lang="en-US" dirty="0" smtClean="0"/>
+              <a:t>If after watching this presentation: </a:t>
+            </a:r>
+          </a:p>
+          <a:p>
+            <a:pPr marL="342900" indent="-342900" algn="l">
+              <a:buFont typeface="Arial" panose="020B0604020202020204" pitchFamily="34" charset="0"/>
+              <a:buChar char="•"/>
+            </a:pPr>
+            <a:r>
+              <a:rPr lang="en-US" dirty="0" smtClean="0"/>
+              <a:t>you truly understand CSS</a:t>
+            </a:r>
+          </a:p>
+          <a:p>
+            <a:pPr marL="342900" indent="-342900" algn="l">
+              <a:buFont typeface="Arial" panose="020B0604020202020204" pitchFamily="34" charset="0"/>
+              <a:buChar char="•"/>
+            </a:pPr>
+            <a:r>
+              <a:rPr lang="en-US" dirty="0" smtClean="0"/>
+              <a:t>you feel that now your life is complete </a:t>
+            </a:r>
+          </a:p>
+          <a:p>
+            <a:pPr algn="l"/>
+            <a:r>
+              <a:rPr lang="en-US" dirty="0" smtClean="0"/>
+              <a:t>Then please start smiling now.</a:t>
+            </a:r>
+          </a:p>
+          <a:p>
+            <a:pPr algn="l"/>
+            <a:endParaRPr lang="en-US" dirty="0" smtClean="0"/>
+          </a:p>
+          <a:p>
+            <a:pPr algn="l"/>
+            <a:endParaRPr lang="en-US"/>
+          </a:p>
+          <a:p>
+            <a:pPr algn="l"/>
+            <a:endParaRPr lang="en-US" dirty="0"/>
+          </a:p>
+          <a:p>
+            <a:pPr algn="l"/>
+            <a:r>
+              <a:rPr lang="en-US" dirty="0" smtClean="0"/>
+              <a:t>This presentation wasn’t sponsored by </a:t>
+            </a:r>
+            <a:r>
+              <a:rPr lang="en-US" dirty="0" err="1" smtClean="0"/>
+              <a:t>SpecSavers</a:t>
+            </a:r>
+            <a:r>
+              <a:rPr lang="en-US" dirty="0"/>
+              <a:t> </a:t>
+            </a:r>
+            <a:r>
+              <a:rPr lang="en-US" dirty="0" smtClean="0">
+                <a:sym typeface="Wingdings" panose="05000000000000000000" pitchFamily="2" charset="2"/>
+              </a:rPr>
+              <a:t></a:t>
+            </a:r>
+            <a:endParaRPr lang="en-US" dirty="0" smtClean="0"/>
+          </a:p>
+        </p:txBody>
+      </p:sp>
+    </p:spTree>
+    <p:extLst>
+      <p:ext uri="{BB962C8B-B14F-4D97-AF65-F5344CB8AC3E}">
+        <p14:creationId xmlns:p14="http://schemas.microsoft.com/office/powerpoint/2010/main" val="701571210"/>
       </p:ext>
     </p:extLst>
   </p:cSld>

</xml_diff>